<commit_message>
updating readme and images
</commit_message>
<xml_diff>
--- a/Resources/Transcripts to Graph.pptx
+++ b/Resources/Transcripts to Graph.pptx
@@ -3551,13 +3551,9 @@
             <a:pPr algn="ctr"/>
             <a:r>
               <a:rPr lang="en-US" dirty="0">
-                <a:ln>
-                  <a:solidFill>
-                    <a:schemeClr val="bg1">
-                      <a:lumMod val="95000"/>
-                    </a:schemeClr>
-                  </a:solidFill>
-                </a:ln>
+                <a:solidFill>
+                  <a:srgbClr val="777777"/>
+                </a:solidFill>
               </a:rPr>
               <a:t>Transcripts from Teams Meetings</a:t>
             </a:r>
@@ -5589,20 +5585,16 @@
         </p:spPr>
         <p:txBody>
           <a:bodyPr>
-            <a:normAutofit fontScale="90000"/>
+            <a:noAutofit/>
           </a:bodyPr>
           <a:lstStyle/>
           <a:p>
             <a:pPr algn="ctr"/>
             <a:r>
-              <a:rPr lang="en-US" dirty="0">
-                <a:ln>
-                  <a:solidFill>
-                    <a:schemeClr val="bg1">
-                      <a:lumMod val="95000"/>
-                    </a:schemeClr>
-                  </a:solidFill>
-                </a:ln>
+              <a:rPr lang="en-US" sz="4000" dirty="0">
+                <a:solidFill>
+                  <a:srgbClr val="777777"/>
+                </a:solidFill>
               </a:rPr>
               <a:t>Transcripts from Stream Upload</a:t>
             </a:r>

</xml_diff>

<commit_message>
updating readme and commenting out console output in script
</commit_message>
<xml_diff>
--- a/Resources/Transcripts to Graph.pptx
+++ b/Resources/Transcripts to Graph.pptx
@@ -116,9 +116,252 @@
 <file path=ppt/revisionInfo.xml><?xml version="1.0" encoding="utf-8"?>
 <p1510:revInfo xmlns:a="http://schemas.openxmlformats.org/drawingml/2006/main" xmlns:r="http://schemas.openxmlformats.org/officeDocument/2006/relationships" xmlns:p1510="http://schemas.microsoft.com/office/powerpoint/2015/10/main">
   <p1510:revLst>
-    <p1510:client id="{D290E291-0C41-4E91-B3E3-9FC93B5C8A5C}" v="1" dt="2025-04-20T13:30:33.894"/>
+    <p1510:client id="{FC27BD52-4E18-43A4-8356-8D141EB9EE6B}" v="2" dt="2025-06-25T18:10:22.217"/>
   </p1510:revLst>
 </p1510:revInfo>
+</file>
+
+<file path=ppt/ink/ink1.xml><?xml version="1.0" encoding="utf-8"?>
+<inkml:ink xmlns:inkml="http://www.w3.org/2003/InkML">
+  <inkml:definitions>
+    <inkml:context xml:id="ctx0">
+      <inkml:inkSource xml:id="inkSrc0">
+        <inkml:traceFormat>
+          <inkml:channel name="X" type="integer" min="-2.14748E9" max="2.14748E9" units="cm"/>
+          <inkml:channel name="Y" type="integer" min="-2.14748E9" max="2.14748E9" units="cm"/>
+          <inkml:channel name="F" type="integer" max="32767" units="dev"/>
+        </inkml:traceFormat>
+        <inkml:channelProperties>
+          <inkml:channelProperty channel="X" name="resolution" value="1000" units="1/cm"/>
+          <inkml:channelProperty channel="Y" name="resolution" value="1000" units="1/cm"/>
+          <inkml:channelProperty channel="F" name="resolution" value="0" units="1/dev"/>
+        </inkml:channelProperties>
+      </inkml:inkSource>
+      <inkml:timestamp xml:id="ts0" timeString="2025-06-25T18:10:09.051"/>
+    </inkml:context>
+    <inkml:brush xml:id="br0">
+      <inkml:brushProperty name="width" value="0.035" units="cm"/>
+      <inkml:brushProperty name="height" value="0.035" units="cm"/>
+    </inkml:brush>
+  </inkml:definitions>
+  <inkml:trace contextRef="#ctx0" brushRef="#br0">1870 471 4609,'7'-15'616,"-1"0"1,-1 0-1,0 0 0,-1-1 1,2-19-1,-6 30-252,-1 0-1,1 0 1,-1 0-1,0 0 1,-1 0 0,1 0-1,-1 0 1,-3-6-1,0 0-90,1 1-196,0 1 0,-1-1-1,-1 1 1,1 0 0,-1 0 0,-1 1 0,0 0 0,-9-9 0,5 8-28,0-1 1,-1 1 0,-1 1 0,0 0 0,-17-7 0,-29-10 298,-15-8 480,39 17-284,1 1-1,-59-17 1,81 30-502,-1 0 1,1 0-1,-16 1 0,-17-3-18,-16-5-49,0 4-1,-65 1 0,91 6 4,-1 2 0,1 1 1,0 1-1,1 3 0,-58 20 0,-60 20 16,-4 2 65,126-39-21,0 0 0,1 3 1,-28 18-1,39-21-37,1 2 1,1 0-1,0 1 1,1 0-1,1 1 1,0 1-1,-15 25 1,-68 137 41,73-130-13,0-4 23,-25 57 258,43-87-240,1-1 1,1 1-1,0 0 1,1 0-1,-2 22 0,5 1 51,0 0 0,7 39-1,18 73 165,-17-113-145,2-1 0,1-1 0,24 51 0,-7-32 110,45 69 1,-39-69-216,65 90 90,-84-126-114,1 0 0,1 0-1,0-2 1,1 0-1,26 17 1,-19-17 43,1-2 1,1-1-1,55 20 1,89 14 274,-118-34-285,-17-5-50,0-1 0,1-2 0,-1-2-1,68-2 1,-58-4 4,1-3 0,-1-1 0,60-19 0,-88 21 37,-1-1 0,1-1 1,-1 0-1,0-2 0,-1 0 0,0-1 1,-1 0-1,0-1 0,0-1 0,19-21 1,-15 12 99,-1-1 0,-1-2 1,18-30-1,34-80 265,-28 51-193,-24 51-57,-2-2 0,12-37 0,-21 52-66,-1 0-1,-1-1 1,-1 1 0,-1-1 0,0-31 0,-3 17 100,-2 1 0,-1 0 0,-2 0 0,-1 0 0,-1 1 0,-2 0-1,-1 0 1,-23-43 0,23 56-62,-2 0-1,0 0 1,-31-32-1,-55-44 275,77 76-321,-26-22 21,-1 2-1,-3 2 0,0 3 0,-87-41 1,17 20-384,-138-41 0,-17 21-3954,279 76 2253,10 2-4626</inkml:trace>
+</inkml:ink>
+</file>
+
+<file path=ppt/ink/ink2.xml><?xml version="1.0" encoding="utf-8"?>
+<inkml:ink xmlns:inkml="http://www.w3.org/2003/InkML">
+  <inkml:definitions>
+    <inkml:context xml:id="ctx0">
+      <inkml:inkSource xml:id="inkSrc0">
+        <inkml:traceFormat>
+          <inkml:channel name="X" type="integer" min="-2.14748E9" max="2.14748E9" units="cm"/>
+          <inkml:channel name="Y" type="integer" min="-2.14748E9" max="2.14748E9" units="cm"/>
+          <inkml:channel name="F" type="integer" max="32767" units="dev"/>
+        </inkml:traceFormat>
+        <inkml:channelProperties>
+          <inkml:channelProperty channel="X" name="resolution" value="1000" units="1/cm"/>
+          <inkml:channelProperty channel="Y" name="resolution" value="1000" units="1/cm"/>
+          <inkml:channelProperty channel="F" name="resolution" value="0" units="1/dev"/>
+        </inkml:channelProperties>
+      </inkml:inkSource>
+      <inkml:timestamp xml:id="ts0" timeString="2025-06-25T18:10:13.297"/>
+    </inkml:context>
+    <inkml:brush xml:id="br0">
+      <inkml:brushProperty name="width" value="0.035" units="cm"/>
+      <inkml:brushProperty name="height" value="0.035" units="cm"/>
+    </inkml:brush>
+  </inkml:definitions>
+  <inkml:trace contextRef="#ctx0" brushRef="#br0">90 55 8706,'-1'-3'49,"0"0"245,0 0 0,1 0 0,-1 0 1,1-1-1,-1 1 0,1 0 0,0 0 1,0 0-1,1 0 0,-1-1 0,1 1 1,0-5-1,1 8 46,0-1 1,0 0-1,1 0 0,-1 1 1,0-1-1,0 1 0,0 0 1,4-1-1,-6 1-276,2 0-76,0 0 0,0 0 0,0 0-1,-1 0 1,1 0 0,0 0 0,0 0-1,0 1 1,0-1 0,-1 1-1,1-1 1,0 1 0,0 0 0,-1 0-1,1-1 1,-1 1 0,1 0 0,-1 0-1,1 1 1,-1-1 0,1 0 0,-1 0-1,0 1 1,2 2 0,-1 0-13,0-1-1,-1 1 1,0 0 0,1 0 0,-1 0 0,-1 0 0,1 0 0,-1 0 0,1 0-1,-1 0 1,0 4 0,-24 192 185,14-134-14,-26 171 1499,-37 291 876,59-373-1800,7 182-1,8-276-562,-1-19-134,2-1 0,11 69 0,-12-107-160,0-1 1,0 1-1,-1 0 1,1 0-1,1-1 1,-1 1-1,0 0 1,1-1-1,-1 0 1,1 1-1,0-1 1,0 0-1,0 0 1,3 3-1,4 2-6774</inkml:trace>
+</inkml:ink>
+</file>
+
+<file path=ppt/ink/ink3.xml><?xml version="1.0" encoding="utf-8"?>
+<inkml:ink xmlns:inkml="http://www.w3.org/2003/InkML">
+  <inkml:definitions>
+    <inkml:context xml:id="ctx0">
+      <inkml:inkSource xml:id="inkSrc0">
+        <inkml:traceFormat>
+          <inkml:channel name="X" type="integer" min="-2.14748E9" max="2.14748E9" units="cm"/>
+          <inkml:channel name="Y" type="integer" min="-2.14748E9" max="2.14748E9" units="cm"/>
+          <inkml:channel name="F" type="integer" max="32767" units="dev"/>
+        </inkml:traceFormat>
+        <inkml:channelProperties>
+          <inkml:channelProperty channel="X" name="resolution" value="1000" units="1/cm"/>
+          <inkml:channelProperty channel="Y" name="resolution" value="1000" units="1/cm"/>
+          <inkml:channelProperty channel="F" name="resolution" value="0" units="1/dev"/>
+        </inkml:channelProperties>
+      </inkml:inkSource>
+      <inkml:timestamp xml:id="ts0" timeString="2025-06-25T18:10:13.843"/>
+    </inkml:context>
+    <inkml:brush xml:id="br0">
+      <inkml:brushProperty name="width" value="0.035" units="cm"/>
+      <inkml:brushProperty name="height" value="0.035" units="cm"/>
+    </inkml:brush>
+  </inkml:definitions>
+  <inkml:trace contextRef="#ctx0" brushRef="#br0">69 65 15491,'5'28'477,"2"0"-1,1-1 1,1 0-1,1 0 1,1-1-1,18 30 1,-20-41-258,107 171 435,-78-130-633,57 63 0,-94-117-13,13 14 238,0-1 0,0-1 0,2 0 0,27 20 0,-37-31-146,1 0 0,0 0 0,0-1 0,0 1 0,0-2 0,1 1 0,-1-1 0,0 0 0,1 0 0,-1-1 0,0 0 0,1-1 0,-1 1 0,1-1 0,11-4 0,9-3 44,0-1 0,43-22 0,-62 27-151,87-42-189,105-69 0,-192 110 171,-2-1 0,1 0 0,0 0 0,-1-1-1,-1 0 1,1 0 0,-1 0 0,0-1 0,9-15 0,-10 12 23,-1 1 0,0 0 1,0-1-1,-1 0 0,0 0 0,-1 0 1,-1 0-1,1-14 0,0 1 26,-2 1 0,-1-1 1,-1 1-1,-5-24 0,6 38-23,-2-1 1,0 1-1,0 0 0,0 0 1,-1 1-1,-1-1 1,1 1-1,-1 0 0,-1 0 1,1 0-1,-1 1 0,-14-13 1,8 11-15,-1 0 1,0 0-1,0 1 1,-1 1 0,0 1-1,0 0 1,-1 0-1,-21-4 1,-4 1-116,-80-7 0,22 13-38,-139 13 0,206-8 178,-169 19 115,171-16 1,1 1 1,1 1 0,-1 2-1,2 1 1,-28 13 0,47-19-103,3-2-24,1 0 0,-1 0 0,0-1 1,-9 3-1,12-5-932,4-2 279,8-4-1484,6-4-4839</inkml:trace>
+</inkml:ink>
+</file>
+
+<file path=ppt/ink/ink4.xml><?xml version="1.0" encoding="utf-8"?>
+<inkml:ink xmlns:inkml="http://www.w3.org/2003/InkML">
+  <inkml:definitions>
+    <inkml:context xml:id="ctx0">
+      <inkml:inkSource xml:id="inkSrc0">
+        <inkml:traceFormat>
+          <inkml:channel name="X" type="integer" min="-2.14748E9" max="2.14748E9" units="cm"/>
+          <inkml:channel name="Y" type="integer" min="-2.14748E9" max="2.14748E9" units="cm"/>
+          <inkml:channel name="F" type="integer" max="32767" units="dev"/>
+        </inkml:traceFormat>
+        <inkml:channelProperties>
+          <inkml:channelProperty channel="X" name="resolution" value="1000" units="1/cm"/>
+          <inkml:channelProperty channel="Y" name="resolution" value="1000" units="1/cm"/>
+          <inkml:channelProperty channel="F" name="resolution" value="0" units="1/dev"/>
+        </inkml:channelProperties>
+      </inkml:inkSource>
+      <inkml:timestamp xml:id="ts0" timeString="2025-06-25T18:10:18.766"/>
+    </inkml:context>
+    <inkml:brush xml:id="br0">
+      <inkml:brushProperty name="width" value="0.035" units="cm"/>
+      <inkml:brushProperty name="height" value="0.035" units="cm"/>
+    </inkml:brush>
+  </inkml:definitions>
+  <inkml:trace contextRef="#ctx0" brushRef="#br0">2 0 3329,'-2'0'968,"2"2"-2656</inkml:trace>
+</inkml:ink>
+</file>
+
+<file path=ppt/ink/ink5.xml><?xml version="1.0" encoding="utf-8"?>
+<inkml:ink xmlns:inkml="http://www.w3.org/2003/InkML">
+  <inkml:definitions>
+    <inkml:context xml:id="ctx0">
+      <inkml:inkSource xml:id="inkSrc0">
+        <inkml:traceFormat>
+          <inkml:channel name="X" type="integer" min="-2.14748E9" max="2.14748E9" units="cm"/>
+          <inkml:channel name="Y" type="integer" min="-2.14748E9" max="2.14748E9" units="cm"/>
+          <inkml:channel name="F" type="integer" max="32767" units="dev"/>
+        </inkml:traceFormat>
+        <inkml:channelProperties>
+          <inkml:channelProperty channel="X" name="resolution" value="1000" units="1/cm"/>
+          <inkml:channelProperty channel="Y" name="resolution" value="1000" units="1/cm"/>
+          <inkml:channelProperty channel="F" name="resolution" value="0" units="1/dev"/>
+        </inkml:channelProperties>
+      </inkml:inkSource>
+      <inkml:timestamp xml:id="ts0" timeString="2025-06-25T18:10:19.434"/>
+    </inkml:context>
+    <inkml:brush xml:id="br0">
+      <inkml:brushProperty name="width" value="0.035" units="cm"/>
+      <inkml:brushProperty name="height" value="0.035" units="cm"/>
+    </inkml:brush>
+  </inkml:definitions>
+  <inkml:trace contextRef="#ctx0" brushRef="#br0">3 95 16259,'-1'-9'88,"0"-30"1089,1 36-1107,0 1 1,0 0-1,0 0 0,1-1 1,-1 1-1,1 0 0,0 0 1,-1 0-1,1-1 0,0 1 0,0 0 1,1 0-1,-1 0 0,2-1 1,-2 1-49,0 1 0,1 0 0,-1 0 0,1 0 0,0 0 0,-1 0 0,1 0 0,0 1 1,0-1-1,-1 0 0,1 1 0,0 0 0,0-1 0,0 1 0,0 0 0,0 0 0,0 0 0,-1 0 1,1 0-1,0 0 0,0 1 0,0-1 0,0 1 0,1 0 0,1 0-2,-1 0 0,1 1 0,-1 0 0,0-1-1,0 1 1,0 0 0,0 1 0,0-1 0,0 1 0,-1-1 0,4 5-1,0 2-81,0 0 0,-1 1 0,0-1 0,-1 1 0,0 0 0,4 15 0,11 66-285,-17-74 322,17 108 413,1 139 1,-17 124-709,12-41 1373,-9-265-447,-5-62-418,2 28 415,-2-43-506,0 0 0,0 0 0,0 0 0,1 0 0,0 0 0,3 7 0,-5-12-97,0 0 0,0 0 0,0 1 0,1-1 0,-1 0 0,0 0 0,0 0 0,0 1 0,0-1 0,1 0 0,-1 0 0,0 0 0,0 0 1,1 0-1,-1 0 0,0 1 0,0-1 0,0 0 0,1 0 0,-1 0 0,0 0 0,0 0 0,1 0 0,-1 0 0,0 0 0,0 0 0,1 0 0,-1 0 0,0 0 0,0 0 0,1 0 1,-1 0-1,0 0 0,0-1 0,1 1 0,-1 0 0,0 0 0,0 0 0,0 0 0,1 0 0,-1-1 0,9-8-97,-3 0-273,0-2-1,0 1 1,-1-1-1,5-13 1,-3 7-869,11-29-5673</inkml:trace>
+</inkml:ink>
+</file>
+
+<file path=ppt/ink/ink6.xml><?xml version="1.0" encoding="utf-8"?>
+<inkml:ink xmlns:inkml="http://www.w3.org/2003/InkML">
+  <inkml:definitions>
+    <inkml:context xml:id="ctx0">
+      <inkml:inkSource xml:id="inkSrc0">
+        <inkml:traceFormat>
+          <inkml:channel name="X" type="integer" min="-2.14748E9" max="2.14748E9" units="cm"/>
+          <inkml:channel name="Y" type="integer" min="-2.14748E9" max="2.14748E9" units="cm"/>
+          <inkml:channel name="F" type="integer" max="32767" units="dev"/>
+        </inkml:traceFormat>
+        <inkml:channelProperties>
+          <inkml:channelProperty channel="X" name="resolution" value="1000" units="1/cm"/>
+          <inkml:channelProperty channel="Y" name="resolution" value="1000" units="1/cm"/>
+          <inkml:channelProperty channel="F" name="resolution" value="0" units="1/dev"/>
+        </inkml:channelProperties>
+      </inkml:inkSource>
+      <inkml:timestamp xml:id="ts0" timeString="2025-06-25T18:10:20.022"/>
+    </inkml:context>
+    <inkml:brush xml:id="br0">
+      <inkml:brushProperty name="width" value="0.035" units="cm"/>
+      <inkml:brushProperty name="height" value="0.035" units="cm"/>
+    </inkml:brush>
+  </inkml:definitions>
+  <inkml:trace contextRef="#ctx0" brushRef="#br0">84 176 14339,'-39'-14'1154,"35"13"-969,1-1 0,-1 0 0,1 0 0,-1 0-1,1-1 1,0 1 0,0-1 0,-4-3 0,6 4-63,0 0 1,0 0-1,0 0 0,0 0 0,0 0 0,0 0 1,0 0-1,1 0 0,-1 0 0,1 0 1,-1 0-1,1 0 0,0 0 0,0-1 1,0 1-1,0 0 0,0 0 0,1 0 1,-1 0-1,0-1 0,1 1 0,0 0 1,0 0-1,-1 0 0,1 0 0,0 0 1,0 1-1,1-1 0,-1 0 0,0 0 1,1 1-1,-1-1 0,1 1 0,-1-1 1,1 1-1,0-1 0,0 1 0,2-1 1,10-3-77,1 2 1,1-1 0,-1 2-1,0 0 1,1 1 0,19 1-1,-4-1 36,456-1 1830,-253-11-1115,-114 3-706,278 3 571,-239 0-633,16 1-31,-129 7-1,1 2 1,52 12 0,-84-12 9,0 0 1,0 2 0,-1 0-1,1 1 1,-1 0 0,0 1-1,-1 0 1,0 1 0,0 1-1,19 17 1,-15-9 17,-1 2 0,-1 0 0,0 0 1,-2 1-1,18 35 0,43 115-234,-72-165 196,30 84-119,-3 1 1,-5 1-1,14 100 0,-27-119 94,2 21-251,35 124 0,23 46-119,-65-238 373,21 81 212,-22-93-65,0 1 1,0-2-1,1 1 1,1 0-1,14 19 0,-7-21 544,-12-10-161,-9-5-609,1 2 71,0 1 1,-1-1-1,0 1 1,1 0-1,-1 1 1,1 0-1,-14 1 1,5-1-11,-275 13-679,81-11 244,-108 2 208,271-2 274,-384 18 233,6 13-258,273-10-166,-12 1-100,24-12-359,130-13 227,11-1-263,13-5-1665,6 1-4855</inkml:trace>
+</inkml:ink>
+</file>
+
+<file path=ppt/ink/ink7.xml><?xml version="1.0" encoding="utf-8"?>
+<inkml:ink xmlns:inkml="http://www.w3.org/2003/InkML">
+  <inkml:definitions>
+    <inkml:context xml:id="ctx0">
+      <inkml:inkSource xml:id="inkSrc0">
+        <inkml:traceFormat>
+          <inkml:channel name="X" type="integer" min="-2.14748E9" max="2.14748E9" units="cm"/>
+          <inkml:channel name="Y" type="integer" min="-2.14748E9" max="2.14748E9" units="cm"/>
+          <inkml:channel name="F" type="integer" max="32767" units="dev"/>
+        </inkml:traceFormat>
+        <inkml:channelProperties>
+          <inkml:channelProperty channel="X" name="resolution" value="1000" units="1/cm"/>
+          <inkml:channelProperty channel="Y" name="resolution" value="1000" units="1/cm"/>
+          <inkml:channelProperty channel="F" name="resolution" value="0" units="1/dev"/>
+        </inkml:channelProperties>
+      </inkml:inkSource>
+      <inkml:timestamp xml:id="ts0" timeString="2025-06-25T18:10:21.002"/>
+    </inkml:context>
+    <inkml:brush xml:id="br0">
+      <inkml:brushProperty name="width" value="0.035" units="cm"/>
+      <inkml:brushProperty name="height" value="0.035" units="cm"/>
+    </inkml:brush>
+  </inkml:definitions>
+  <inkml:trace contextRef="#ctx0" brushRef="#br0">238 49 13315,'-4'-14'-265,"4"13"380,0 0 0,-1-1 0,1 1 0,0 0 0,0 0 0,-1-1 1,1 1-1,-1 0 0,1 0 0,-1 0 0,1 0 0,-1 0 0,0 0 0,1 0 0,-1 0 0,0 0 0,0 0 1,0 0-1,0 0 0,0 0 0,0 1 0,0-1 0,0 0 0,0 1 0,0-1 0,0 1 0,-1-1 0,-1 0 1,-12-1-19,-1 0 0,-25 0 0,34 2 2,0 0-1,1 1 0,-1 0 0,0 0 1,0 1-1,1 0 0,-1 0 0,-10 5 1,16-6-78,-1 0 1,1 0-1,-1 0 1,1 1-1,0-1 1,-1 0-1,1 1 1,0-1-1,0 1 0,0-1 1,0 1-1,0-1 1,0 1-1,0 0 1,1-1-1,-1 1 1,1 0-1,-1 0 1,1 0-1,0-1 1,-1 1-1,1 0 1,0 0-1,0 0 1,0 0-1,1 0 1,-1-1-1,0 1 0,1 2 1,1 2-1,-1-1 1,1 1-1,0-1 1,1 0-1,-1 0 1,1 0-1,0 0 1,4 6-1,16 14-73,1 0 1,45 35-1,12 11 379,-71-61-75,0 1-1,-1 0 1,15 22-1,-21-27-127,0 0 0,0 0 0,0 0 0,-1 1 0,0-1 0,0 1-1,0-1 1,-1 1 0,0 0 0,0 9 0,-2-12-35,1 0 0,-1 0 0,0 1 0,0-1 0,0 0 0,-1 0 0,1-1 0,-1 1 0,0 0 0,0 0 0,0-1 0,-1 1 0,-5 5-1,-3 3 94,0-1 0,-16 12 0,22-19-137,-1 0 1,1 0-1,-1-1 1,0 0-1,0 0 1,0-1-1,0 1 1,0-1-1,-1 0 1,1-1-1,-1 0 1,1 0-1,-1 0 1,0-1-1,1 0 1,-1 0-1,1-1 1,-12-1-1,-65-22-2260,30 2-3662,48 18 78</inkml:trace>
+</inkml:ink>
+</file>
+
+<file path=ppt/ink/ink8.xml><?xml version="1.0" encoding="utf-8"?>
+<inkml:ink xmlns:inkml="http://www.w3.org/2003/InkML">
+  <inkml:definitions>
+    <inkml:context xml:id="ctx0">
+      <inkml:inkSource xml:id="inkSrc0">
+        <inkml:traceFormat>
+          <inkml:channel name="X" type="integer" min="-2.14748E9" max="2.14748E9" units="cm"/>
+          <inkml:channel name="Y" type="integer" min="-2.14748E9" max="2.14748E9" units="cm"/>
+          <inkml:channel name="F" type="integer" max="32767" units="dev"/>
+        </inkml:traceFormat>
+        <inkml:channelProperties>
+          <inkml:channelProperty channel="X" name="resolution" value="1000" units="1/cm"/>
+          <inkml:channelProperty channel="Y" name="resolution" value="1000" units="1/cm"/>
+          <inkml:channelProperty channel="F" name="resolution" value="0" units="1/dev"/>
+        </inkml:channelProperties>
+      </inkml:inkSource>
+      <inkml:timestamp xml:id="ts0" timeString="2025-06-25T18:10:21.436"/>
+    </inkml:context>
+    <inkml:brush xml:id="br0">
+      <inkml:brushProperty name="width" value="0.035" units="cm"/>
+      <inkml:brushProperty name="height" value="0.035" units="cm"/>
+    </inkml:brush>
+  </inkml:definitions>
+  <inkml:trace contextRef="#ctx0" brushRef="#br0">1 539 17668,'0'13'287,"-1"0"-1,2-1 1,0 1 0,0 0-1,1-1 1,1 1 0,6 20 0,-6-28-351,0 0 0,0-1 0,0 1 1,1-1-1,-1 0 0,1 0 1,0 0-1,5 3 0,-8-6 48,-1-1 1,1 0-1,-1 1 0,1-1 1,-1 0-1,1 1 0,-1-1 0,1 0 1,-1 0-1,1 0 0,-1 1 1,1-1-1,-1 0 0,1 0 0,-1 0 1,1 0-1,0 0 0,-1 0 1,1 0-1,-1 0 0,1 0 0,-1 0 1,1 0-1,-1 0 0,1-1 1,0 1-1,-1 0 0,1-1 0,0 1 8,0-1 0,0 0 1,0 0-1,-1 0 0,1 0 0,0 0 0,0 0 0,-1 0 0,1-1 0,-1 1 0,1 0 0,-1-2 0,3-5 34,-2 0 0,1 0 0,0-9 1,-2 14-42,18-351 2708,-14 246-2214,-4 95-396,1 0 0,0-1 0,6-19-1,-6 29-92,0 0 0,1 0 0,-1 0-1,1 0 1,0 0 0,0 1 0,1-1-1,-1 0 1,1 1 0,0 0 0,0 0-1,0 0 1,0 0 0,7-5 0,0 2-8,2 0-1,-1 0 1,1 1 0,-1 1 0,14-3-1,1 0 127,35-3-1,-56 9-82,0 1-1,0 0 0,1 0 1,-1 0-1,0 0 0,0 1 1,0 0-1,1 0 0,-1 0 1,0 1-1,0 0 1,-1 0-1,1 0 0,0 0 1,4 4-1,-5-3-36,-1-1 0,0 1 0,0 0 1,0 1-1,0-1 0,-1 0 0,1 1 0,-1-1 0,0 1 0,0 0 0,0 0 0,-1 0 0,1 0 1,-1 0-1,0 0 0,0 0 0,0 0 0,-1 0 0,1 5 0,-1-4-12,0-1-1,-1 0 1,1 1-1,-1-1 0,0 0 1,0 0-1,-1 0 1,1 0-1,-3 5 1,-22 35-56,18-32 112,-13 20 90,-3 0 0,0-1 0,-41 38 0,22-29-655,-78 55 0,108-86 168,9-7 149,0 0 0,0 1 0,0-1 0,1 1-1,-1 0 1,1 0 0,0 0 0,0 0-1,0 1 1,-4 6 0,6-9 50,1-1 0,0 1-1,0 0 1,-1 0 0,1-1-1,0 1 1,0 0 0,0 0 0,0-1-1,0 1 1,0 0 0,0 0 0,0-1-1,1 1 1,-1 0 0,0 0 0,1 1-1,3 5-5718</inkml:trace>
+</inkml:ink>
+</file>
+
+<file path=ppt/ink/ink9.xml><?xml version="1.0" encoding="utf-8"?>
+<inkml:ink xmlns:inkml="http://www.w3.org/2003/InkML">
+  <inkml:definitions>
+    <inkml:context xml:id="ctx0">
+      <inkml:inkSource xml:id="inkSrc0">
+        <inkml:traceFormat>
+          <inkml:channel name="X" type="integer" min="-2.14748E9" max="2.14748E9" units="cm"/>
+          <inkml:channel name="Y" type="integer" min="-2.14748E9" max="2.14748E9" units="cm"/>
+          <inkml:channel name="F" type="integer" max="32767" units="dev"/>
+        </inkml:traceFormat>
+        <inkml:channelProperties>
+          <inkml:channelProperty channel="X" name="resolution" value="1000" units="1/cm"/>
+          <inkml:channelProperty channel="Y" name="resolution" value="1000" units="1/cm"/>
+          <inkml:channelProperty channel="F" name="resolution" value="0" units="1/dev"/>
+        </inkml:channelProperties>
+      </inkml:inkSource>
+      <inkml:timestamp xml:id="ts0" timeString="2025-06-25T18:10:21.718"/>
+    </inkml:context>
+    <inkml:brush xml:id="br0">
+      <inkml:brushProperty name="width" value="0.035" units="cm"/>
+      <inkml:brushProperty name="height" value="0.035" units="cm"/>
+    </inkml:brush>
+  </inkml:definitions>
+  <inkml:trace contextRef="#ctx0" brushRef="#br0">34 281 16772,'-5'7'383,"1"0"0,0 0 0,0 1 0,1-1 0,0 1 0,1 0 0,-1 0 0,1 0 0,1 0 0,0 0 0,-1 14 1,2 6-164,7 47 0,-6-66-242,1 0 0,0 0 0,1 0-1,0 0 1,0-1 0,1 0 0,0 1 0,0-1-1,7 9 1,-8-14 74,0 1-1,1-1 1,-1 0-1,1 0 0,0-1 1,0 1-1,-1-1 1,2 1-1,-1-1 0,0-1 1,0 1-1,1 0 1,-1-1-1,1 0 1,-1 0-1,1-1 0,-1 1 1,1-1-1,0 0 1,6 0-1,3-2 116,1 0 0,-1 0 0,0-1 0,0-1 0,17-7 0,-11 3-66,0 0 0,-1-2-1,0 0 1,0-1 0,-1-1-1,-1-1 1,20-17 0,-28 21-83,-1 1-1,0-2 1,0 1 0,-1-1-1,-1 0 1,1 0 0,-2-1-1,1 0 1,-2 0 0,1 0-1,-1 0 1,-1-1 0,0 0-1,2-17 1,-4 17-91,-1 0-1,0 0 1,-1 0-1,0 0 1,0 0-1,-2 0 1,1 0 0,-1 0-1,-1 1 1,0-1-1,-1 1 1,0 0 0,-1 0-1,0 1 1,0 0-1,-2 0 1,1 0-1,-1 1 1,-15-14 0,-56-39-2481,69 51 1753,9 10 687,1 1-1,0 0 1,-1 0 0,1-1-1,0 1 1,-1 0 0,1-1-1,0 1 1,0-1 0,-1 1-1,1 0 1,0-1-1,0 1 1,0-1 0,0 1-1,0-1 1,-1 1 0,1 0-1,0-1 1,0 1 0,0-1-1,0 1 1,0-1 0,0 1-1,1-1 1,-1 1 0,0 0-1,0-2 1</inkml:trace>
+</inkml:ink>
 </file>
 
 <file path=ppt/slideLayouts/slideLayout1.xml><?xml version="1.0" encoding="utf-8"?>
@@ -268,7 +511,7 @@
           <a:p>
             <a:fld id="{26B90FAC-6C84-454A-AC92-110DA14E0AF7}" type="datetimeFigureOut">
               <a:rPr lang="en-US" smtClean="0"/>
-              <a:t>4/20/2025</a:t>
+              <a:t>6/25/2025</a:t>
             </a:fld>
             <a:endParaRPr lang="en-US"/>
           </a:p>
@@ -466,7 +709,7 @@
           <a:p>
             <a:fld id="{26B90FAC-6C84-454A-AC92-110DA14E0AF7}" type="datetimeFigureOut">
               <a:rPr lang="en-US" smtClean="0"/>
-              <a:t>4/20/2025</a:t>
+              <a:t>6/25/2025</a:t>
             </a:fld>
             <a:endParaRPr lang="en-US"/>
           </a:p>
@@ -674,7 +917,7 @@
           <a:p>
             <a:fld id="{26B90FAC-6C84-454A-AC92-110DA14E0AF7}" type="datetimeFigureOut">
               <a:rPr lang="en-US" smtClean="0"/>
-              <a:t>4/20/2025</a:t>
+              <a:t>6/25/2025</a:t>
             </a:fld>
             <a:endParaRPr lang="en-US"/>
           </a:p>
@@ -872,7 +1115,7 @@
           <a:p>
             <a:fld id="{26B90FAC-6C84-454A-AC92-110DA14E0AF7}" type="datetimeFigureOut">
               <a:rPr lang="en-US" smtClean="0"/>
-              <a:t>4/20/2025</a:t>
+              <a:t>6/25/2025</a:t>
             </a:fld>
             <a:endParaRPr lang="en-US"/>
           </a:p>
@@ -1147,7 +1390,7 @@
           <a:p>
             <a:fld id="{26B90FAC-6C84-454A-AC92-110DA14E0AF7}" type="datetimeFigureOut">
               <a:rPr lang="en-US" smtClean="0"/>
-              <a:t>4/20/2025</a:t>
+              <a:t>6/25/2025</a:t>
             </a:fld>
             <a:endParaRPr lang="en-US"/>
           </a:p>
@@ -1412,7 +1655,7 @@
           <a:p>
             <a:fld id="{26B90FAC-6C84-454A-AC92-110DA14E0AF7}" type="datetimeFigureOut">
               <a:rPr lang="en-US" smtClean="0"/>
-              <a:t>4/20/2025</a:t>
+              <a:t>6/25/2025</a:t>
             </a:fld>
             <a:endParaRPr lang="en-US"/>
           </a:p>
@@ -1824,7 +2067,7 @@
           <a:p>
             <a:fld id="{26B90FAC-6C84-454A-AC92-110DA14E0AF7}" type="datetimeFigureOut">
               <a:rPr lang="en-US" smtClean="0"/>
-              <a:t>4/20/2025</a:t>
+              <a:t>6/25/2025</a:t>
             </a:fld>
             <a:endParaRPr lang="en-US"/>
           </a:p>
@@ -1965,7 +2208,7 @@
           <a:p>
             <a:fld id="{26B90FAC-6C84-454A-AC92-110DA14E0AF7}" type="datetimeFigureOut">
               <a:rPr lang="en-US" smtClean="0"/>
-              <a:t>4/20/2025</a:t>
+              <a:t>6/25/2025</a:t>
             </a:fld>
             <a:endParaRPr lang="en-US"/>
           </a:p>
@@ -2078,7 +2321,7 @@
           <a:p>
             <a:fld id="{26B90FAC-6C84-454A-AC92-110DA14E0AF7}" type="datetimeFigureOut">
               <a:rPr lang="en-US" smtClean="0"/>
-              <a:t>4/20/2025</a:t>
+              <a:t>6/25/2025</a:t>
             </a:fld>
             <a:endParaRPr lang="en-US"/>
           </a:p>
@@ -2389,7 +2632,7 @@
           <a:p>
             <a:fld id="{26B90FAC-6C84-454A-AC92-110DA14E0AF7}" type="datetimeFigureOut">
               <a:rPr lang="en-US" smtClean="0"/>
-              <a:t>4/20/2025</a:t>
+              <a:t>6/25/2025</a:t>
             </a:fld>
             <a:endParaRPr lang="en-US"/>
           </a:p>
@@ -2677,7 +2920,7 @@
           <a:p>
             <a:fld id="{26B90FAC-6C84-454A-AC92-110DA14E0AF7}" type="datetimeFigureOut">
               <a:rPr lang="en-US" smtClean="0"/>
-              <a:t>4/20/2025</a:t>
+              <a:t>6/25/2025</a:t>
             </a:fld>
             <a:endParaRPr lang="en-US"/>
           </a:p>
@@ -2918,7 +3161,7 @@
           <a:p>
             <a:fld id="{26B90FAC-6C84-454A-AC92-110DA14E0AF7}" type="datetimeFigureOut">
               <a:rPr lang="en-US" smtClean="0"/>
-              <a:t>4/20/2025</a:t>
+              <a:t>6/25/2025</a:t>
             </a:fld>
             <a:endParaRPr lang="en-US"/>
           </a:p>
@@ -5340,6 +5583,507 @@
           </a:p>
         </p:txBody>
       </p:sp>
+      <mc:AlternateContent xmlns:mc="http://schemas.openxmlformats.org/markup-compatibility/2006">
+        <mc:Choice xmlns:p14="http://schemas.microsoft.com/office/powerpoint/2010/main" Requires="p14">
+          <p:contentPart p14:bwMode="auto" r:id="rId15">
+            <p14:nvContentPartPr>
+              <p14:cNvPr id="2" name="Ink 1">
+                <a:extLst>
+                  <a:ext uri="{FF2B5EF4-FFF2-40B4-BE49-F238E27FC236}">
+                    <a16:creationId xmlns:a16="http://schemas.microsoft.com/office/drawing/2014/main" id="{23AFFD5A-A677-1AB4-18C9-FBFA482A4874}"/>
+                  </a:ext>
+                </a:extLst>
+              </p14:cNvPr>
+              <p14:cNvContentPartPr/>
+              <p14:nvPr/>
+            </p14:nvContentPartPr>
+            <p14:xfrm>
+              <a:off x="9862526" y="1349314"/>
+              <a:ext cx="685440" cy="723600"/>
+            </p14:xfrm>
+          </p:contentPart>
+        </mc:Choice>
+        <mc:Fallback>
+          <p:pic>
+            <p:nvPicPr>
+              <p:cNvPr id="2" name="Ink 1">
+                <a:extLst>
+                  <a:ext uri="{FF2B5EF4-FFF2-40B4-BE49-F238E27FC236}">
+                    <a16:creationId xmlns:a16="http://schemas.microsoft.com/office/drawing/2014/main" id="{23AFFD5A-A677-1AB4-18C9-FBFA482A4874}"/>
+                  </a:ext>
+                </a:extLst>
+              </p:cNvPr>
+              <p:cNvPicPr/>
+              <p:nvPr/>
+            </p:nvPicPr>
+            <p:blipFill>
+              <a:blip r:embed="rId16"/>
+              <a:stretch>
+                <a:fillRect/>
+              </a:stretch>
+            </p:blipFill>
+            <p:spPr>
+              <a:xfrm>
+                <a:off x="9856406" y="1343194"/>
+                <a:ext cx="697680" cy="735840"/>
+              </a:xfrm>
+              <a:prstGeom prst="rect">
+                <a:avLst/>
+              </a:prstGeom>
+            </p:spPr>
+          </p:pic>
+        </mc:Fallback>
+      </mc:AlternateContent>
+      <p:grpSp>
+        <p:nvGrpSpPr>
+          <p:cNvPr id="7" name="Group 6">
+            <a:extLst>
+              <a:ext uri="{FF2B5EF4-FFF2-40B4-BE49-F238E27FC236}">
+                <a16:creationId xmlns:a16="http://schemas.microsoft.com/office/drawing/2014/main" id="{86998B09-A2DD-3CA8-E77D-0498A13D1183}"/>
+              </a:ext>
+            </a:extLst>
+          </p:cNvPr>
+          <p:cNvGrpSpPr/>
+          <p:nvPr/>
+        </p:nvGrpSpPr>
+        <p:grpSpPr>
+          <a:xfrm>
+            <a:off x="9968366" y="2104954"/>
+            <a:ext cx="423720" cy="761400"/>
+            <a:chOff x="9968366" y="2104954"/>
+            <a:chExt cx="423720" cy="761400"/>
+          </a:xfrm>
+        </p:grpSpPr>
+        <mc:AlternateContent xmlns:mc="http://schemas.openxmlformats.org/markup-compatibility/2006">
+          <mc:Choice xmlns:p14="http://schemas.microsoft.com/office/powerpoint/2010/main" Requires="p14">
+            <p:contentPart p14:bwMode="auto" r:id="rId17">
+              <p14:nvContentPartPr>
+                <p14:cNvPr id="3" name="Ink 2">
+                  <a:extLst>
+                    <a:ext uri="{FF2B5EF4-FFF2-40B4-BE49-F238E27FC236}">
+                      <a16:creationId xmlns:a16="http://schemas.microsoft.com/office/drawing/2014/main" id="{7BC8FFCC-5C50-7868-38E5-373056C6D143}"/>
+                    </a:ext>
+                  </a:extLst>
+                </p14:cNvPr>
+                <p14:cNvContentPartPr/>
+                <p14:nvPr/>
+              </p14:nvContentPartPr>
+              <p14:xfrm>
+                <a:off x="10175366" y="2104954"/>
+                <a:ext cx="59400" cy="682200"/>
+              </p14:xfrm>
+            </p:contentPart>
+          </mc:Choice>
+          <mc:Fallback>
+            <p:pic>
+              <p:nvPicPr>
+                <p:cNvPr id="3" name="Ink 2">
+                  <a:extLst>
+                    <a:ext uri="{FF2B5EF4-FFF2-40B4-BE49-F238E27FC236}">
+                      <a16:creationId xmlns:a16="http://schemas.microsoft.com/office/drawing/2014/main" id="{7BC8FFCC-5C50-7868-38E5-373056C6D143}"/>
+                    </a:ext>
+                  </a:extLst>
+                </p:cNvPr>
+                <p:cNvPicPr/>
+                <p:nvPr/>
+              </p:nvPicPr>
+              <p:blipFill>
+                <a:blip r:embed="rId18"/>
+                <a:stretch>
+                  <a:fillRect/>
+                </a:stretch>
+              </p:blipFill>
+              <p:spPr>
+                <a:xfrm>
+                  <a:off x="10169246" y="2098834"/>
+                  <a:ext cx="71640" cy="694440"/>
+                </a:xfrm>
+                <a:prstGeom prst="rect">
+                  <a:avLst/>
+                </a:prstGeom>
+              </p:spPr>
+            </p:pic>
+          </mc:Fallback>
+        </mc:AlternateContent>
+        <mc:AlternateContent xmlns:mc="http://schemas.openxmlformats.org/markup-compatibility/2006">
+          <mc:Choice xmlns:p14="http://schemas.microsoft.com/office/powerpoint/2010/main" Requires="p14">
+            <p:contentPart p14:bwMode="auto" r:id="rId19">
+              <p14:nvContentPartPr>
+                <p14:cNvPr id="5" name="Ink 4">
+                  <a:extLst>
+                    <a:ext uri="{FF2B5EF4-FFF2-40B4-BE49-F238E27FC236}">
+                      <a16:creationId xmlns:a16="http://schemas.microsoft.com/office/drawing/2014/main" id="{EA78C996-2D8A-D202-DD04-8A678DB6FCA2}"/>
+                    </a:ext>
+                  </a:extLst>
+                </p14:cNvPr>
+                <p14:cNvContentPartPr/>
+                <p14:nvPr/>
+              </p14:nvContentPartPr>
+              <p14:xfrm>
+                <a:off x="9968366" y="2587354"/>
+                <a:ext cx="423720" cy="279000"/>
+              </p14:xfrm>
+            </p:contentPart>
+          </mc:Choice>
+          <mc:Fallback>
+            <p:pic>
+              <p:nvPicPr>
+                <p:cNvPr id="5" name="Ink 4">
+                  <a:extLst>
+                    <a:ext uri="{FF2B5EF4-FFF2-40B4-BE49-F238E27FC236}">
+                      <a16:creationId xmlns:a16="http://schemas.microsoft.com/office/drawing/2014/main" id="{EA78C996-2D8A-D202-DD04-8A678DB6FCA2}"/>
+                    </a:ext>
+                  </a:extLst>
+                </p:cNvPr>
+                <p:cNvPicPr/>
+                <p:nvPr/>
+              </p:nvPicPr>
+              <p:blipFill>
+                <a:blip r:embed="rId20"/>
+                <a:stretch>
+                  <a:fillRect/>
+                </a:stretch>
+              </p:blipFill>
+              <p:spPr>
+                <a:xfrm>
+                  <a:off x="9962246" y="2581234"/>
+                  <a:ext cx="435960" cy="291240"/>
+                </a:xfrm>
+                <a:prstGeom prst="rect">
+                  <a:avLst/>
+                </a:prstGeom>
+              </p:spPr>
+            </p:pic>
+          </mc:Fallback>
+        </mc:AlternateContent>
+      </p:grpSp>
+      <p:grpSp>
+        <p:nvGrpSpPr>
+          <p:cNvPr id="17" name="Group 16">
+            <a:extLst>
+              <a:ext uri="{FF2B5EF4-FFF2-40B4-BE49-F238E27FC236}">
+                <a16:creationId xmlns:a16="http://schemas.microsoft.com/office/drawing/2014/main" id="{F9FE09BC-F930-704B-B671-DBAD3C08C58E}"/>
+              </a:ext>
+            </a:extLst>
+          </p:cNvPr>
+          <p:cNvGrpSpPr/>
+          <p:nvPr/>
+        </p:nvGrpSpPr>
+        <p:grpSpPr>
+          <a:xfrm>
+            <a:off x="9847766" y="3238594"/>
+            <a:ext cx="1026360" cy="683280"/>
+            <a:chOff x="9847766" y="3238594"/>
+            <a:chExt cx="1026360" cy="683280"/>
+          </a:xfrm>
+        </p:grpSpPr>
+        <mc:AlternateContent xmlns:mc="http://schemas.openxmlformats.org/markup-compatibility/2006">
+          <mc:Choice xmlns:p14="http://schemas.microsoft.com/office/powerpoint/2010/main" Requires="p14">
+            <p:contentPart p14:bwMode="auto" r:id="rId21">
+              <p14:nvContentPartPr>
+                <p14:cNvPr id="9" name="Ink 8">
+                  <a:extLst>
+                    <a:ext uri="{FF2B5EF4-FFF2-40B4-BE49-F238E27FC236}">
+                      <a16:creationId xmlns:a16="http://schemas.microsoft.com/office/drawing/2014/main" id="{2359D384-E151-B76E-0B17-628D66EA57CF}"/>
+                    </a:ext>
+                  </a:extLst>
+                </p14:cNvPr>
+                <p14:cNvContentPartPr/>
+                <p14:nvPr/>
+              </p14:nvContentPartPr>
+              <p14:xfrm>
+                <a:off x="9943886" y="3299794"/>
+                <a:ext cx="1080" cy="1080"/>
+              </p14:xfrm>
+            </p:contentPart>
+          </mc:Choice>
+          <mc:Fallback>
+            <p:pic>
+              <p:nvPicPr>
+                <p:cNvPr id="9" name="Ink 8">
+                  <a:extLst>
+                    <a:ext uri="{FF2B5EF4-FFF2-40B4-BE49-F238E27FC236}">
+                      <a16:creationId xmlns:a16="http://schemas.microsoft.com/office/drawing/2014/main" id="{2359D384-E151-B76E-0B17-628D66EA57CF}"/>
+                    </a:ext>
+                  </a:extLst>
+                </p:cNvPr>
+                <p:cNvPicPr/>
+                <p:nvPr/>
+              </p:nvPicPr>
+              <p:blipFill>
+                <a:blip r:embed="rId22"/>
+                <a:stretch>
+                  <a:fillRect/>
+                </a:stretch>
+              </p:blipFill>
+              <p:spPr>
+                <a:xfrm>
+                  <a:off x="9937766" y="3293674"/>
+                  <a:ext cx="13320" cy="13320"/>
+                </a:xfrm>
+                <a:prstGeom prst="rect">
+                  <a:avLst/>
+                </a:prstGeom>
+              </p:spPr>
+            </p:pic>
+          </mc:Fallback>
+        </mc:AlternateContent>
+        <mc:AlternateContent xmlns:mc="http://schemas.openxmlformats.org/markup-compatibility/2006">
+          <mc:Choice xmlns:p14="http://schemas.microsoft.com/office/powerpoint/2010/main" Requires="p14">
+            <p:contentPart p14:bwMode="auto" r:id="rId23">
+              <p14:nvContentPartPr>
+                <p14:cNvPr id="11" name="Ink 10">
+                  <a:extLst>
+                    <a:ext uri="{FF2B5EF4-FFF2-40B4-BE49-F238E27FC236}">
+                      <a16:creationId xmlns:a16="http://schemas.microsoft.com/office/drawing/2014/main" id="{A3A2078D-F24F-6A7C-91FC-B093A4C4D2E2}"/>
+                    </a:ext>
+                  </a:extLst>
+                </p14:cNvPr>
+                <p14:cNvContentPartPr/>
+                <p14:nvPr/>
+              </p14:nvContentPartPr>
+              <p14:xfrm>
+                <a:off x="9847766" y="3278194"/>
+                <a:ext cx="112680" cy="554760"/>
+              </p14:xfrm>
+            </p:contentPart>
+          </mc:Choice>
+          <mc:Fallback>
+            <p:pic>
+              <p:nvPicPr>
+                <p:cNvPr id="11" name="Ink 10">
+                  <a:extLst>
+                    <a:ext uri="{FF2B5EF4-FFF2-40B4-BE49-F238E27FC236}">
+                      <a16:creationId xmlns:a16="http://schemas.microsoft.com/office/drawing/2014/main" id="{A3A2078D-F24F-6A7C-91FC-B093A4C4D2E2}"/>
+                    </a:ext>
+                  </a:extLst>
+                </p:cNvPr>
+                <p:cNvPicPr/>
+                <p:nvPr/>
+              </p:nvPicPr>
+              <p:blipFill>
+                <a:blip r:embed="rId24"/>
+                <a:stretch>
+                  <a:fillRect/>
+                </a:stretch>
+              </p:blipFill>
+              <p:spPr>
+                <a:xfrm>
+                  <a:off x="9841646" y="3272074"/>
+                  <a:ext cx="124920" cy="567000"/>
+                </a:xfrm>
+                <a:prstGeom prst="rect">
+                  <a:avLst/>
+                </a:prstGeom>
+              </p:spPr>
+            </p:pic>
+          </mc:Fallback>
+        </mc:AlternateContent>
+        <mc:AlternateContent xmlns:mc="http://schemas.openxmlformats.org/markup-compatibility/2006">
+          <mc:Choice xmlns:p14="http://schemas.microsoft.com/office/powerpoint/2010/main" Requires="p14">
+            <p:contentPart p14:bwMode="auto" r:id="rId25">
+              <p14:nvContentPartPr>
+                <p14:cNvPr id="13" name="Ink 12">
+                  <a:extLst>
+                    <a:ext uri="{FF2B5EF4-FFF2-40B4-BE49-F238E27FC236}">
+                      <a16:creationId xmlns:a16="http://schemas.microsoft.com/office/drawing/2014/main" id="{6C32040E-424C-A1DA-6102-B92DB82A2D48}"/>
+                    </a:ext>
+                  </a:extLst>
+                </p14:cNvPr>
+                <p14:cNvContentPartPr/>
+                <p14:nvPr/>
+              </p14:nvContentPartPr>
+              <p14:xfrm>
+                <a:off x="9912566" y="3238594"/>
+                <a:ext cx="961560" cy="683280"/>
+              </p14:xfrm>
+            </p:contentPart>
+          </mc:Choice>
+          <mc:Fallback>
+            <p:pic>
+              <p:nvPicPr>
+                <p:cNvPr id="13" name="Ink 12">
+                  <a:extLst>
+                    <a:ext uri="{FF2B5EF4-FFF2-40B4-BE49-F238E27FC236}">
+                      <a16:creationId xmlns:a16="http://schemas.microsoft.com/office/drawing/2014/main" id="{6C32040E-424C-A1DA-6102-B92DB82A2D48}"/>
+                    </a:ext>
+                  </a:extLst>
+                </p:cNvPr>
+                <p:cNvPicPr/>
+                <p:nvPr/>
+              </p:nvPicPr>
+              <p:blipFill>
+                <a:blip r:embed="rId26"/>
+                <a:stretch>
+                  <a:fillRect/>
+                </a:stretch>
+              </p:blipFill>
+              <p:spPr>
+                <a:xfrm>
+                  <a:off x="9906446" y="3232474"/>
+                  <a:ext cx="973800" cy="695520"/>
+                </a:xfrm>
+                <a:prstGeom prst="rect">
+                  <a:avLst/>
+                </a:prstGeom>
+              </p:spPr>
+            </p:pic>
+          </mc:Fallback>
+        </mc:AlternateContent>
+        <mc:AlternateContent xmlns:mc="http://schemas.openxmlformats.org/markup-compatibility/2006">
+          <mc:Choice xmlns:p14="http://schemas.microsoft.com/office/powerpoint/2010/main" Requires="p14">
+            <p:contentPart p14:bwMode="auto" r:id="rId27">
+              <p14:nvContentPartPr>
+                <p14:cNvPr id="14" name="Ink 13">
+                  <a:extLst>
+                    <a:ext uri="{FF2B5EF4-FFF2-40B4-BE49-F238E27FC236}">
+                      <a16:creationId xmlns:a16="http://schemas.microsoft.com/office/drawing/2014/main" id="{34D8BA94-1E9F-8253-9121-EB79FA5E46A8}"/>
+                    </a:ext>
+                  </a:extLst>
+                </p14:cNvPr>
+                <p14:cNvContentPartPr/>
+                <p14:nvPr/>
+              </p14:nvContentPartPr>
+              <p14:xfrm>
+                <a:off x="10065566" y="3482674"/>
+                <a:ext cx="124920" cy="211320"/>
+              </p14:xfrm>
+            </p:contentPart>
+          </mc:Choice>
+          <mc:Fallback>
+            <p:pic>
+              <p:nvPicPr>
+                <p:cNvPr id="14" name="Ink 13">
+                  <a:extLst>
+                    <a:ext uri="{FF2B5EF4-FFF2-40B4-BE49-F238E27FC236}">
+                      <a16:creationId xmlns:a16="http://schemas.microsoft.com/office/drawing/2014/main" id="{34D8BA94-1E9F-8253-9121-EB79FA5E46A8}"/>
+                    </a:ext>
+                  </a:extLst>
+                </p:cNvPr>
+                <p:cNvPicPr/>
+                <p:nvPr/>
+              </p:nvPicPr>
+              <p:blipFill>
+                <a:blip r:embed="rId28"/>
+                <a:stretch>
+                  <a:fillRect/>
+                </a:stretch>
+              </p:blipFill>
+              <p:spPr>
+                <a:xfrm>
+                  <a:off x="10059446" y="3476554"/>
+                  <a:ext cx="137160" cy="223560"/>
+                </a:xfrm>
+                <a:prstGeom prst="rect">
+                  <a:avLst/>
+                </a:prstGeom>
+              </p:spPr>
+            </p:pic>
+          </mc:Fallback>
+        </mc:AlternateContent>
+        <mc:AlternateContent xmlns:mc="http://schemas.openxmlformats.org/markup-compatibility/2006">
+          <mc:Choice xmlns:p14="http://schemas.microsoft.com/office/powerpoint/2010/main" Requires="p14">
+            <p:contentPart p14:bwMode="auto" r:id="rId29">
+              <p14:nvContentPartPr>
+                <p14:cNvPr id="15" name="Ink 14">
+                  <a:extLst>
+                    <a:ext uri="{FF2B5EF4-FFF2-40B4-BE49-F238E27FC236}">
+                      <a16:creationId xmlns:a16="http://schemas.microsoft.com/office/drawing/2014/main" id="{1E88F078-13CE-BA0C-3824-DEF7CC32EA97}"/>
+                    </a:ext>
+                  </a:extLst>
+                </p14:cNvPr>
+                <p14:cNvContentPartPr/>
+                <p14:nvPr/>
+              </p14:nvContentPartPr>
+              <p14:xfrm>
+                <a:off x="10250246" y="3439474"/>
+                <a:ext cx="162720" cy="254520"/>
+              </p14:xfrm>
+            </p:contentPart>
+          </mc:Choice>
+          <mc:Fallback>
+            <p:pic>
+              <p:nvPicPr>
+                <p:cNvPr id="15" name="Ink 14">
+                  <a:extLst>
+                    <a:ext uri="{FF2B5EF4-FFF2-40B4-BE49-F238E27FC236}">
+                      <a16:creationId xmlns:a16="http://schemas.microsoft.com/office/drawing/2014/main" id="{1E88F078-13CE-BA0C-3824-DEF7CC32EA97}"/>
+                    </a:ext>
+                  </a:extLst>
+                </p:cNvPr>
+                <p:cNvPicPr/>
+                <p:nvPr/>
+              </p:nvPicPr>
+              <p:blipFill>
+                <a:blip r:embed="rId30"/>
+                <a:stretch>
+                  <a:fillRect/>
+                </a:stretch>
+              </p:blipFill>
+              <p:spPr>
+                <a:xfrm>
+                  <a:off x="10244126" y="3433354"/>
+                  <a:ext cx="174960" cy="266760"/>
+                </a:xfrm>
+                <a:prstGeom prst="rect">
+                  <a:avLst/>
+                </a:prstGeom>
+              </p:spPr>
+            </p:pic>
+          </mc:Fallback>
+        </mc:AlternateContent>
+        <mc:AlternateContent xmlns:mc="http://schemas.openxmlformats.org/markup-compatibility/2006">
+          <mc:Choice xmlns:p14="http://schemas.microsoft.com/office/powerpoint/2010/main" Requires="p14">
+            <p:contentPart p14:bwMode="auto" r:id="rId31">
+              <p14:nvContentPartPr>
+                <p14:cNvPr id="16" name="Ink 15">
+                  <a:extLst>
+                    <a:ext uri="{FF2B5EF4-FFF2-40B4-BE49-F238E27FC236}">
+                      <a16:creationId xmlns:a16="http://schemas.microsoft.com/office/drawing/2014/main" id="{D67D7910-5919-97A4-EABD-D4EBF3FA7AB1}"/>
+                    </a:ext>
+                  </a:extLst>
+                </p14:cNvPr>
+                <p14:cNvContentPartPr/>
+                <p14:nvPr/>
+              </p14:nvContentPartPr>
+              <p14:xfrm>
+                <a:off x="10416566" y="3490594"/>
+                <a:ext cx="179280" cy="224280"/>
+              </p14:xfrm>
+            </p:contentPart>
+          </mc:Choice>
+          <mc:Fallback>
+            <p:pic>
+              <p:nvPicPr>
+                <p:cNvPr id="16" name="Ink 15">
+                  <a:extLst>
+                    <a:ext uri="{FF2B5EF4-FFF2-40B4-BE49-F238E27FC236}">
+                      <a16:creationId xmlns:a16="http://schemas.microsoft.com/office/drawing/2014/main" id="{D67D7910-5919-97A4-EABD-D4EBF3FA7AB1}"/>
+                    </a:ext>
+                  </a:extLst>
+                </p:cNvPr>
+                <p:cNvPicPr/>
+                <p:nvPr/>
+              </p:nvPicPr>
+              <p:blipFill>
+                <a:blip r:embed="rId32"/>
+                <a:stretch>
+                  <a:fillRect/>
+                </a:stretch>
+              </p:blipFill>
+              <p:spPr>
+                <a:xfrm>
+                  <a:off x="10410446" y="3484474"/>
+                  <a:ext cx="191520" cy="236520"/>
+                </a:xfrm>
+                <a:prstGeom prst="rect">
+                  <a:avLst/>
+                </a:prstGeom>
+              </p:spPr>
+            </p:pic>
+          </mc:Fallback>
+        </mc:AlternateContent>
+      </p:grpSp>
     </p:spTree>
     <p:extLst>
       <p:ext uri="{BB962C8B-B14F-4D97-AF65-F5344CB8AC3E}">

</xml_diff>